<commit_message>
Mise en place du dossier App
</commit_message>
<xml_diff>
--- a/Dossier Support ordi/DOSSIER Support Ordi.pptx
+++ b/Dossier Support ordi/DOSSIER Support Ordi.pptx
@@ -211,7 +211,7 @@
           <a:p>
             <a:fld id="{175ECC00-C06A-4323-852F-768318D8586A}" type="datetimeFigureOut">
               <a:rPr lang="fr-FR" smtClean="0"/>
-              <a:t>15/01/2025</a:t>
+              <a:t>19/01/2025</a:t>
             </a:fld>
             <a:endParaRPr lang="fr-FR"/>
           </a:p>
@@ -376,7 +376,7 @@
           <a:p>
             <a:fld id="{AE8DAB01-C85E-4F33-91A5-B6D112914A5D}" type="datetimeFigureOut">
               <a:rPr lang="fr-FR" smtClean="0"/>
-              <a:t>15/01/2025</a:t>
+              <a:t>19/01/2025</a:t>
             </a:fld>
             <a:endParaRPr lang="fr-FR"/>
           </a:p>
@@ -775,7 +775,7 @@
           <a:p>
             <a:fld id="{A69F3118-5675-4AEB-B17B-1E109ACFC119}" type="datetimeFigureOut">
               <a:rPr lang="fr-FR" smtClean="0"/>
-              <a:t>15/01/2025</a:t>
+              <a:t>19/01/2025</a:t>
             </a:fld>
             <a:endParaRPr lang="fr-FR"/>
           </a:p>
@@ -945,7 +945,7 @@
           <a:p>
             <a:fld id="{A69F3118-5675-4AEB-B17B-1E109ACFC119}" type="datetimeFigureOut">
               <a:rPr lang="fr-FR" smtClean="0"/>
-              <a:t>15/01/2025</a:t>
+              <a:t>19/01/2025</a:t>
             </a:fld>
             <a:endParaRPr lang="fr-FR"/>
           </a:p>
@@ -1125,7 +1125,7 @@
           <a:p>
             <a:fld id="{A69F3118-5675-4AEB-B17B-1E109ACFC119}" type="datetimeFigureOut">
               <a:rPr lang="fr-FR" smtClean="0"/>
-              <a:t>15/01/2025</a:t>
+              <a:t>19/01/2025</a:t>
             </a:fld>
             <a:endParaRPr lang="fr-FR"/>
           </a:p>
@@ -1295,7 +1295,7 @@
           <a:p>
             <a:fld id="{A69F3118-5675-4AEB-B17B-1E109ACFC119}" type="datetimeFigureOut">
               <a:rPr lang="fr-FR" smtClean="0"/>
-              <a:t>15/01/2025</a:t>
+              <a:t>19/01/2025</a:t>
             </a:fld>
             <a:endParaRPr lang="fr-FR"/>
           </a:p>
@@ -1539,7 +1539,7 @@
           <a:p>
             <a:fld id="{A69F3118-5675-4AEB-B17B-1E109ACFC119}" type="datetimeFigureOut">
               <a:rPr lang="fr-FR" smtClean="0"/>
-              <a:t>15/01/2025</a:t>
+              <a:t>19/01/2025</a:t>
             </a:fld>
             <a:endParaRPr lang="fr-FR"/>
           </a:p>
@@ -1771,7 +1771,7 @@
           <a:p>
             <a:fld id="{A69F3118-5675-4AEB-B17B-1E109ACFC119}" type="datetimeFigureOut">
               <a:rPr lang="fr-FR" smtClean="0"/>
-              <a:t>15/01/2025</a:t>
+              <a:t>19/01/2025</a:t>
             </a:fld>
             <a:endParaRPr lang="fr-FR"/>
           </a:p>
@@ -2138,7 +2138,7 @@
           <a:p>
             <a:fld id="{A69F3118-5675-4AEB-B17B-1E109ACFC119}" type="datetimeFigureOut">
               <a:rPr lang="fr-FR" smtClean="0"/>
-              <a:t>15/01/2025</a:t>
+              <a:t>19/01/2025</a:t>
             </a:fld>
             <a:endParaRPr lang="fr-FR"/>
           </a:p>
@@ -2256,7 +2256,7 @@
           <a:p>
             <a:fld id="{A69F3118-5675-4AEB-B17B-1E109ACFC119}" type="datetimeFigureOut">
               <a:rPr lang="fr-FR" smtClean="0"/>
-              <a:t>15/01/2025</a:t>
+              <a:t>19/01/2025</a:t>
             </a:fld>
             <a:endParaRPr lang="fr-FR"/>
           </a:p>
@@ -2351,7 +2351,7 @@
           <a:p>
             <a:fld id="{A69F3118-5675-4AEB-B17B-1E109ACFC119}" type="datetimeFigureOut">
               <a:rPr lang="fr-FR" smtClean="0"/>
-              <a:t>15/01/2025</a:t>
+              <a:t>19/01/2025</a:t>
             </a:fld>
             <a:endParaRPr lang="fr-FR"/>
           </a:p>
@@ -2628,7 +2628,7 @@
           <a:p>
             <a:fld id="{A69F3118-5675-4AEB-B17B-1E109ACFC119}" type="datetimeFigureOut">
               <a:rPr lang="fr-FR" smtClean="0"/>
-              <a:t>15/01/2025</a:t>
+              <a:t>19/01/2025</a:t>
             </a:fld>
             <a:endParaRPr lang="fr-FR"/>
           </a:p>
@@ -2885,7 +2885,7 @@
           <a:p>
             <a:fld id="{A69F3118-5675-4AEB-B17B-1E109ACFC119}" type="datetimeFigureOut">
               <a:rPr lang="fr-FR" smtClean="0"/>
-              <a:t>15/01/2025</a:t>
+              <a:t>19/01/2025</a:t>
             </a:fld>
             <a:endParaRPr lang="fr-FR"/>
           </a:p>
@@ -3098,7 +3098,7 @@
           <a:p>
             <a:fld id="{A69F3118-5675-4AEB-B17B-1E109ACFC119}" type="datetimeFigureOut">
               <a:rPr lang="fr-FR" smtClean="0"/>
-              <a:t>15/01/2025</a:t>
+              <a:t>19/01/2025</a:t>
             </a:fld>
             <a:endParaRPr lang="fr-FR"/>
           </a:p>
@@ -4740,7 +4740,7 @@
         </p:nvSpPr>
         <p:spPr>
           <a:xfrm>
-            <a:off x="4361768" y="9643883"/>
+            <a:off x="4361768" y="9626950"/>
             <a:ext cx="8247583" cy="474640"/>
           </a:xfrm>
           <a:prstGeom prst="rect">

</xml_diff>